<commit_message>
Ingame Menu, color Option, Resources, etc implemented, stable
</commit_message>
<xml_diff>
--- a/Resources/nodeimg/프레젠테이션1.pptx
+++ b/Resources/nodeimg/프레젠테이션1.pptx
@@ -9,6 +9,7 @@
     <p:sldId id="258" r:id="rId3"/>
     <p:sldId id="257" r:id="rId4"/>
     <p:sldId id="259" r:id="rId5"/>
+    <p:sldId id="260" r:id="rId6"/>
   </p:sldIdLst>
   <p:sldSz cx="9144000" cy="6858000" type="screen4x3"/>
   <p:notesSz cx="6858000" cy="9144000"/>
@@ -4315,6 +4316,348 @@
 </p:sld>
 </file>
 
+<file path=ppt/slides/slide5.xml><?xml version="1.0" encoding="utf-8"?>
+<p:sld xmlns:a="http://schemas.openxmlformats.org/drawingml/2006/main" xmlns:r="http://schemas.openxmlformats.org/officeDocument/2006/relationships" xmlns:p="http://schemas.openxmlformats.org/presentationml/2006/main">
+  <p:cSld>
+    <p:spTree>
+      <p:nvGrpSpPr>
+        <p:cNvPr id="1" name=""/>
+        <p:cNvGrpSpPr/>
+        <p:nvPr/>
+      </p:nvGrpSpPr>
+      <p:grpSpPr>
+        <a:xfrm>
+          <a:off x="0" y="0"/>
+          <a:ext cx="0" cy="0"/>
+          <a:chOff x="0" y="0"/>
+          <a:chExt cx="0" cy="0"/>
+        </a:xfrm>
+      </p:grpSpPr>
+      <p:grpSp>
+        <p:nvGrpSpPr>
+          <p:cNvPr id="7" name="그룹 6"/>
+          <p:cNvGrpSpPr/>
+          <p:nvPr/>
+        </p:nvGrpSpPr>
+        <p:grpSpPr>
+          <a:xfrm>
+            <a:off x="179512" y="692696"/>
+            <a:ext cx="3168352" cy="3348372"/>
+            <a:chOff x="2483768" y="1736322"/>
+            <a:chExt cx="3168352" cy="3348372"/>
+          </a:xfrm>
+          <a:solidFill>
+            <a:schemeClr val="tx1"/>
+          </a:solidFill>
+        </p:grpSpPr>
+        <p:sp>
+          <p:nvSpPr>
+            <p:cNvPr id="4" name="직사각형 3"/>
+            <p:cNvSpPr/>
+            <p:nvPr/>
+          </p:nvSpPr>
+          <p:spPr>
+            <a:xfrm>
+              <a:off x="4860032" y="2636422"/>
+              <a:ext cx="792088" cy="2448272"/>
+            </a:xfrm>
+            <a:prstGeom prst="rect">
+              <a:avLst/>
+            </a:prstGeom>
+            <a:grpFill/>
+            <a:ln>
+              <a:solidFill>
+                <a:schemeClr val="bg1"/>
+              </a:solidFill>
+            </a:ln>
+          </p:spPr>
+          <p:style>
+            <a:lnRef idx="2">
+              <a:schemeClr val="accent1">
+                <a:shade val="50000"/>
+              </a:schemeClr>
+            </a:lnRef>
+            <a:fillRef idx="1">
+              <a:schemeClr val="accent1"/>
+            </a:fillRef>
+            <a:effectRef idx="0">
+              <a:schemeClr val="accent1"/>
+            </a:effectRef>
+            <a:fontRef idx="minor">
+              <a:schemeClr val="lt1"/>
+            </a:fontRef>
+          </p:style>
+          <p:txBody>
+            <a:bodyPr rtlCol="0" anchor="ctr"/>
+            <a:lstStyle/>
+            <a:p>
+              <a:pPr algn="ctr"/>
+              <a:endParaRPr lang="ko-KR" altLang="en-US"/>
+            </a:p>
+          </p:txBody>
+        </p:sp>
+        <p:sp>
+          <p:nvSpPr>
+            <p:cNvPr id="5" name="직사각형 4"/>
+            <p:cNvSpPr/>
+            <p:nvPr/>
+          </p:nvSpPr>
+          <p:spPr>
+            <a:xfrm>
+              <a:off x="3671900" y="1736322"/>
+              <a:ext cx="792088" cy="3348372"/>
+            </a:xfrm>
+            <a:prstGeom prst="rect">
+              <a:avLst/>
+            </a:prstGeom>
+            <a:grpFill/>
+            <a:ln>
+              <a:solidFill>
+                <a:schemeClr val="bg1"/>
+              </a:solidFill>
+            </a:ln>
+          </p:spPr>
+          <p:style>
+            <a:lnRef idx="2">
+              <a:schemeClr val="accent1">
+                <a:shade val="50000"/>
+              </a:schemeClr>
+            </a:lnRef>
+            <a:fillRef idx="1">
+              <a:schemeClr val="accent1"/>
+            </a:fillRef>
+            <a:effectRef idx="0">
+              <a:schemeClr val="accent1"/>
+            </a:effectRef>
+            <a:fontRef idx="minor">
+              <a:schemeClr val="lt1"/>
+            </a:fontRef>
+          </p:style>
+          <p:txBody>
+            <a:bodyPr rtlCol="0" anchor="ctr"/>
+            <a:lstStyle/>
+            <a:p>
+              <a:pPr algn="ctr"/>
+              <a:endParaRPr lang="ko-KR" altLang="en-US"/>
+            </a:p>
+          </p:txBody>
+        </p:sp>
+        <p:sp>
+          <p:nvSpPr>
+            <p:cNvPr id="6" name="직사각형 5"/>
+            <p:cNvSpPr/>
+            <p:nvPr/>
+          </p:nvSpPr>
+          <p:spPr>
+            <a:xfrm>
+              <a:off x="2483768" y="3356502"/>
+              <a:ext cx="792088" cy="1728192"/>
+            </a:xfrm>
+            <a:prstGeom prst="rect">
+              <a:avLst/>
+            </a:prstGeom>
+            <a:grpFill/>
+            <a:ln>
+              <a:solidFill>
+                <a:schemeClr val="bg1"/>
+              </a:solidFill>
+            </a:ln>
+          </p:spPr>
+          <p:style>
+            <a:lnRef idx="2">
+              <a:schemeClr val="accent1">
+                <a:shade val="50000"/>
+              </a:schemeClr>
+            </a:lnRef>
+            <a:fillRef idx="1">
+              <a:schemeClr val="accent1"/>
+            </a:fillRef>
+            <a:effectRef idx="0">
+              <a:schemeClr val="accent1"/>
+            </a:effectRef>
+            <a:fontRef idx="minor">
+              <a:schemeClr val="lt1"/>
+            </a:fontRef>
+          </p:style>
+          <p:txBody>
+            <a:bodyPr rtlCol="0" anchor="ctr"/>
+            <a:lstStyle/>
+            <a:p>
+              <a:pPr algn="ctr"/>
+              <a:endParaRPr lang="ko-KR" altLang="en-US"/>
+            </a:p>
+          </p:txBody>
+        </p:sp>
+      </p:grpSp>
+      <p:grpSp>
+        <p:nvGrpSpPr>
+          <p:cNvPr id="8" name="그룹 7"/>
+          <p:cNvGrpSpPr/>
+          <p:nvPr/>
+        </p:nvGrpSpPr>
+        <p:grpSpPr>
+          <a:xfrm>
+            <a:off x="4283968" y="764704"/>
+            <a:ext cx="3168352" cy="3348372"/>
+            <a:chOff x="2483768" y="1736322"/>
+            <a:chExt cx="3168352" cy="3348372"/>
+          </a:xfrm>
+          <a:solidFill>
+            <a:schemeClr val="bg1"/>
+          </a:solidFill>
+        </p:grpSpPr>
+        <p:sp>
+          <p:nvSpPr>
+            <p:cNvPr id="9" name="직사각형 8"/>
+            <p:cNvSpPr/>
+            <p:nvPr/>
+          </p:nvSpPr>
+          <p:spPr>
+            <a:xfrm>
+              <a:off x="4860032" y="2636422"/>
+              <a:ext cx="792088" cy="2448272"/>
+            </a:xfrm>
+            <a:prstGeom prst="rect">
+              <a:avLst/>
+            </a:prstGeom>
+            <a:grpFill/>
+            <a:ln>
+              <a:solidFill>
+                <a:schemeClr val="tx1"/>
+              </a:solidFill>
+            </a:ln>
+          </p:spPr>
+          <p:style>
+            <a:lnRef idx="2">
+              <a:schemeClr val="accent1">
+                <a:shade val="50000"/>
+              </a:schemeClr>
+            </a:lnRef>
+            <a:fillRef idx="1">
+              <a:schemeClr val="accent1"/>
+            </a:fillRef>
+            <a:effectRef idx="0">
+              <a:schemeClr val="accent1"/>
+            </a:effectRef>
+            <a:fontRef idx="minor">
+              <a:schemeClr val="lt1"/>
+            </a:fontRef>
+          </p:style>
+          <p:txBody>
+            <a:bodyPr rtlCol="0" anchor="ctr"/>
+            <a:lstStyle/>
+            <a:p>
+              <a:pPr algn="ctr"/>
+              <a:endParaRPr lang="ko-KR" altLang="en-US"/>
+            </a:p>
+          </p:txBody>
+        </p:sp>
+        <p:sp>
+          <p:nvSpPr>
+            <p:cNvPr id="10" name="직사각형 9"/>
+            <p:cNvSpPr/>
+            <p:nvPr/>
+          </p:nvSpPr>
+          <p:spPr>
+            <a:xfrm>
+              <a:off x="3671900" y="1736322"/>
+              <a:ext cx="792088" cy="3348372"/>
+            </a:xfrm>
+            <a:prstGeom prst="rect">
+              <a:avLst/>
+            </a:prstGeom>
+            <a:grpFill/>
+            <a:ln>
+              <a:solidFill>
+                <a:schemeClr val="tx1"/>
+              </a:solidFill>
+            </a:ln>
+          </p:spPr>
+          <p:style>
+            <a:lnRef idx="2">
+              <a:schemeClr val="accent1">
+                <a:shade val="50000"/>
+              </a:schemeClr>
+            </a:lnRef>
+            <a:fillRef idx="1">
+              <a:schemeClr val="accent1"/>
+            </a:fillRef>
+            <a:effectRef idx="0">
+              <a:schemeClr val="accent1"/>
+            </a:effectRef>
+            <a:fontRef idx="minor">
+              <a:schemeClr val="lt1"/>
+            </a:fontRef>
+          </p:style>
+          <p:txBody>
+            <a:bodyPr rtlCol="0" anchor="ctr"/>
+            <a:lstStyle/>
+            <a:p>
+              <a:pPr algn="ctr"/>
+              <a:endParaRPr lang="ko-KR" altLang="en-US"/>
+            </a:p>
+          </p:txBody>
+        </p:sp>
+        <p:sp>
+          <p:nvSpPr>
+            <p:cNvPr id="11" name="직사각형 10"/>
+            <p:cNvSpPr/>
+            <p:nvPr/>
+          </p:nvSpPr>
+          <p:spPr>
+            <a:xfrm>
+              <a:off x="2483768" y="3356502"/>
+              <a:ext cx="792088" cy="1728192"/>
+            </a:xfrm>
+            <a:prstGeom prst="rect">
+              <a:avLst/>
+            </a:prstGeom>
+            <a:grpFill/>
+            <a:ln>
+              <a:solidFill>
+                <a:schemeClr val="tx1"/>
+              </a:solidFill>
+            </a:ln>
+          </p:spPr>
+          <p:style>
+            <a:lnRef idx="2">
+              <a:schemeClr val="accent1">
+                <a:shade val="50000"/>
+              </a:schemeClr>
+            </a:lnRef>
+            <a:fillRef idx="1">
+              <a:schemeClr val="accent1"/>
+            </a:fillRef>
+            <a:effectRef idx="0">
+              <a:schemeClr val="accent1"/>
+            </a:effectRef>
+            <a:fontRef idx="minor">
+              <a:schemeClr val="lt1"/>
+            </a:fontRef>
+          </p:style>
+          <p:txBody>
+            <a:bodyPr rtlCol="0" anchor="ctr"/>
+            <a:lstStyle/>
+            <a:p>
+              <a:pPr algn="ctr"/>
+              <a:endParaRPr lang="ko-KR" altLang="en-US"/>
+            </a:p>
+          </p:txBody>
+        </p:sp>
+      </p:grpSp>
+    </p:spTree>
+    <p:extLst>
+      <p:ext uri="{BB962C8B-B14F-4D97-AF65-F5344CB8AC3E}">
+        <p14:creationId xmlns:p14="http://schemas.microsoft.com/office/powerpoint/2010/main" val="1377712154"/>
+      </p:ext>
+    </p:extLst>
+  </p:cSld>
+  <p:clrMapOvr>
+    <a:masterClrMapping/>
+  </p:clrMapOvr>
+</p:sld>
+</file>
+
 <file path=ppt/theme/theme1.xml><?xml version="1.0" encoding="utf-8"?>
 <a:theme xmlns:a="http://schemas.openxmlformats.org/drawingml/2006/main" name="Office 테마">
   <a:themeElements>

</xml_diff>